<commit_message>
[ENSG ASI 2014] wip principes ASI
</commit_message>
<xml_diff>
--- a/cours/ensg-asi-2014/src/img_gen.pptx
+++ b/cours/ensg-asi-2014/src/img_gen.pptx
@@ -7,6 +7,7 @@
   <p:sldIdLst>
     <p:sldId id="256" r:id="rId2"/>
     <p:sldId id="257" r:id="rId3"/>
+    <p:sldId id="258" r:id="rId4"/>
   </p:sldIdLst>
   <p:sldSz cx="9144000" cy="6858000" type="screen4x3"/>
   <p:notesSz cx="6858000" cy="9144000"/>
@@ -3403,6 +3404,521 @@
 </p:sld>
 </file>
 
+<file path=ppt/slides/slide3.xml><?xml version="1.0" encoding="utf-8"?>
+<p:sld xmlns:a="http://schemas.openxmlformats.org/drawingml/2006/main" xmlns:r="http://schemas.openxmlformats.org/officeDocument/2006/relationships" xmlns:p="http://schemas.openxmlformats.org/presentationml/2006/main">
+  <p:cSld>
+    <p:spTree>
+      <p:nvGrpSpPr>
+        <p:cNvPr id="1" name=""/>
+        <p:cNvGrpSpPr/>
+        <p:nvPr/>
+      </p:nvGrpSpPr>
+      <p:grpSpPr>
+        <a:xfrm>
+          <a:off x="0" y="0"/>
+          <a:ext cx="0" cy="0"/>
+          <a:chOff x="0" y="0"/>
+          <a:chExt cx="0" cy="0"/>
+        </a:xfrm>
+      </p:grpSpPr>
+      <p:sp>
+        <p:nvSpPr>
+          <p:cNvPr id="40" name="Rectangle 39"/>
+          <p:cNvSpPr/>
+          <p:nvPr/>
+        </p:nvSpPr>
+        <p:spPr>
+          <a:xfrm>
+            <a:off x="4427984" y="260648"/>
+            <a:ext cx="3744416" cy="6264696"/>
+          </a:xfrm>
+          <a:prstGeom prst="rect">
+            <a:avLst/>
+          </a:prstGeom>
+          <a:noFill/>
+          <a:ln>
+            <a:prstDash val="sysDash"/>
+          </a:ln>
+        </p:spPr>
+        <p:style>
+          <a:lnRef idx="2">
+            <a:schemeClr val="accent6"/>
+          </a:lnRef>
+          <a:fillRef idx="1">
+            <a:schemeClr val="lt1"/>
+          </a:fillRef>
+          <a:effectRef idx="0">
+            <a:schemeClr val="accent6"/>
+          </a:effectRef>
+          <a:fontRef idx="minor">
+            <a:schemeClr val="dk1"/>
+          </a:fontRef>
+        </p:style>
+        <p:txBody>
+          <a:bodyPr rtlCol="0" anchor="ctr"/>
+          <a:lstStyle/>
+          <a:p>
+            <a:pPr algn="ctr"/>
+            <a:endParaRPr lang="fr-FR"/>
+          </a:p>
+        </p:txBody>
+      </p:sp>
+      <p:sp>
+        <p:nvSpPr>
+          <p:cNvPr id="39" name="Rectangle 38"/>
+          <p:cNvSpPr/>
+          <p:nvPr/>
+        </p:nvSpPr>
+        <p:spPr>
+          <a:xfrm>
+            <a:off x="539552" y="260648"/>
+            <a:ext cx="3744416" cy="6264696"/>
+          </a:xfrm>
+          <a:prstGeom prst="rect">
+            <a:avLst/>
+          </a:prstGeom>
+          <a:noFill/>
+          <a:ln>
+            <a:prstDash val="sysDash"/>
+          </a:ln>
+        </p:spPr>
+        <p:style>
+          <a:lnRef idx="2">
+            <a:schemeClr val="accent6"/>
+          </a:lnRef>
+          <a:fillRef idx="1">
+            <a:schemeClr val="lt1"/>
+          </a:fillRef>
+          <a:effectRef idx="0">
+            <a:schemeClr val="accent6"/>
+          </a:effectRef>
+          <a:fontRef idx="minor">
+            <a:schemeClr val="dk1"/>
+          </a:fontRef>
+        </p:style>
+        <p:txBody>
+          <a:bodyPr rtlCol="0" anchor="ctr"/>
+          <a:lstStyle/>
+          <a:p>
+            <a:pPr algn="ctr"/>
+            <a:endParaRPr lang="fr-FR"/>
+          </a:p>
+        </p:txBody>
+      </p:sp>
+      <p:sp>
+        <p:nvSpPr>
+          <p:cNvPr id="4" name="Rectangle à coins arrondis 3"/>
+          <p:cNvSpPr/>
+          <p:nvPr/>
+        </p:nvSpPr>
+        <p:spPr>
+          <a:xfrm>
+            <a:off x="827584" y="764704"/>
+            <a:ext cx="2448272" cy="1296144"/>
+          </a:xfrm>
+          <a:prstGeom prst="roundRect">
+            <a:avLst/>
+          </a:prstGeom>
+        </p:spPr>
+        <p:style>
+          <a:lnRef idx="1">
+            <a:schemeClr val="dk1"/>
+          </a:lnRef>
+          <a:fillRef idx="2">
+            <a:schemeClr val="dk1"/>
+          </a:fillRef>
+          <a:effectRef idx="1">
+            <a:schemeClr val="dk1"/>
+          </a:effectRef>
+          <a:fontRef idx="minor">
+            <a:schemeClr val="dk1"/>
+          </a:fontRef>
+        </p:style>
+        <p:txBody>
+          <a:bodyPr rtlCol="0" anchor="ctr"/>
+          <a:lstStyle/>
+          <a:p>
+            <a:pPr algn="ctr"/>
+            <a:r>
+              <a:rPr lang="fr-FR" sz="4000" dirty="0" smtClean="0"/>
+              <a:t>Client</a:t>
+            </a:r>
+            <a:endParaRPr lang="fr-FR" sz="4000" dirty="0"/>
+          </a:p>
+        </p:txBody>
+      </p:sp>
+      <p:sp>
+        <p:nvSpPr>
+          <p:cNvPr id="3" name="Rectangle à coins arrondis 2"/>
+          <p:cNvSpPr/>
+          <p:nvPr/>
+        </p:nvSpPr>
+        <p:spPr>
+          <a:xfrm>
+            <a:off x="5580112" y="764704"/>
+            <a:ext cx="2448272" cy="1296144"/>
+          </a:xfrm>
+          <a:prstGeom prst="roundRect">
+            <a:avLst/>
+          </a:prstGeom>
+        </p:spPr>
+        <p:style>
+          <a:lnRef idx="1">
+            <a:schemeClr val="dk1"/>
+          </a:lnRef>
+          <a:fillRef idx="2">
+            <a:schemeClr val="dk1"/>
+          </a:fillRef>
+          <a:effectRef idx="1">
+            <a:schemeClr val="dk1"/>
+          </a:effectRef>
+          <a:fontRef idx="minor">
+            <a:schemeClr val="dk1"/>
+          </a:fontRef>
+        </p:style>
+        <p:txBody>
+          <a:bodyPr rtlCol="0" anchor="ctr"/>
+          <a:lstStyle/>
+          <a:p>
+            <a:pPr algn="ctr"/>
+            <a:r>
+              <a:rPr lang="fr-FR" sz="4000" dirty="0" smtClean="0"/>
+              <a:t>Serveur</a:t>
+            </a:r>
+            <a:endParaRPr lang="fr-FR" sz="4000" dirty="0"/>
+          </a:p>
+        </p:txBody>
+      </p:sp>
+      <p:sp>
+        <p:nvSpPr>
+          <p:cNvPr id="12" name="Rectangle à coins arrondis 11"/>
+          <p:cNvSpPr/>
+          <p:nvPr/>
+        </p:nvSpPr>
+        <p:spPr>
+          <a:xfrm>
+            <a:off x="827584" y="2924944"/>
+            <a:ext cx="2448272" cy="1296144"/>
+          </a:xfrm>
+          <a:prstGeom prst="roundRect">
+            <a:avLst/>
+          </a:prstGeom>
+        </p:spPr>
+        <p:style>
+          <a:lnRef idx="1">
+            <a:schemeClr val="dk1"/>
+          </a:lnRef>
+          <a:fillRef idx="2">
+            <a:schemeClr val="dk1"/>
+          </a:fillRef>
+          <a:effectRef idx="1">
+            <a:schemeClr val="dk1"/>
+          </a:effectRef>
+          <a:fontRef idx="minor">
+            <a:schemeClr val="dk1"/>
+          </a:fontRef>
+        </p:style>
+        <p:txBody>
+          <a:bodyPr rtlCol="0" anchor="ctr"/>
+          <a:lstStyle/>
+          <a:p>
+            <a:pPr algn="ctr"/>
+            <a:r>
+              <a:rPr lang="fr-FR" sz="2400" dirty="0" smtClean="0"/>
+              <a:t>Interface Middleware</a:t>
+            </a:r>
+            <a:endParaRPr lang="fr-FR" sz="2400" dirty="0"/>
+          </a:p>
+        </p:txBody>
+      </p:sp>
+      <p:sp>
+        <p:nvSpPr>
+          <p:cNvPr id="13" name="Rectangle à coins arrondis 12"/>
+          <p:cNvSpPr/>
+          <p:nvPr/>
+        </p:nvSpPr>
+        <p:spPr>
+          <a:xfrm>
+            <a:off x="5580112" y="2924944"/>
+            <a:ext cx="2448272" cy="1296144"/>
+          </a:xfrm>
+          <a:prstGeom prst="roundRect">
+            <a:avLst/>
+          </a:prstGeom>
+        </p:spPr>
+        <p:style>
+          <a:lnRef idx="1">
+            <a:schemeClr val="dk1"/>
+          </a:lnRef>
+          <a:fillRef idx="2">
+            <a:schemeClr val="dk1"/>
+          </a:fillRef>
+          <a:effectRef idx="1">
+            <a:schemeClr val="dk1"/>
+          </a:effectRef>
+          <a:fontRef idx="minor">
+            <a:schemeClr val="dk1"/>
+          </a:fontRef>
+        </p:style>
+        <p:txBody>
+          <a:bodyPr rtlCol="0" anchor="ctr"/>
+          <a:lstStyle/>
+          <a:p>
+            <a:pPr algn="ctr"/>
+            <a:r>
+              <a:rPr lang="fr-FR" sz="2400" dirty="0" smtClean="0"/>
+              <a:t>Interface Middleware</a:t>
+            </a:r>
+            <a:endParaRPr lang="fr-FR" sz="2400" dirty="0"/>
+          </a:p>
+        </p:txBody>
+      </p:sp>
+      <p:cxnSp>
+        <p:nvCxnSpPr>
+          <p:cNvPr id="21" name="Connecteur droit avec flèche 20"/>
+          <p:cNvCxnSpPr>
+            <a:stCxn id="4" idx="3"/>
+            <a:endCxn id="3" idx="1"/>
+          </p:cNvCxnSpPr>
+          <p:nvPr/>
+        </p:nvCxnSpPr>
+        <p:spPr>
+          <a:xfrm>
+            <a:off x="3275856" y="1412776"/>
+            <a:ext cx="2304256" cy="0"/>
+          </a:xfrm>
+          <a:prstGeom prst="straightConnector1">
+            <a:avLst/>
+          </a:prstGeom>
+          <a:ln>
+            <a:prstDash val="sysDash"/>
+            <a:headEnd type="arrow"/>
+            <a:tailEnd type="arrow"/>
+          </a:ln>
+        </p:spPr>
+        <p:style>
+          <a:lnRef idx="3">
+            <a:schemeClr val="dk1"/>
+          </a:lnRef>
+          <a:fillRef idx="0">
+            <a:schemeClr val="dk1"/>
+          </a:fillRef>
+          <a:effectRef idx="2">
+            <a:schemeClr val="dk1"/>
+          </a:effectRef>
+          <a:fontRef idx="minor">
+            <a:schemeClr val="tx1"/>
+          </a:fontRef>
+        </p:style>
+      </p:cxnSp>
+      <p:sp>
+        <p:nvSpPr>
+          <p:cNvPr id="28" name="Rectangle à coins arrondis 27"/>
+          <p:cNvSpPr/>
+          <p:nvPr/>
+        </p:nvSpPr>
+        <p:spPr>
+          <a:xfrm>
+            <a:off x="1475656" y="5013176"/>
+            <a:ext cx="6264696" cy="1296144"/>
+          </a:xfrm>
+          <a:prstGeom prst="roundRect">
+            <a:avLst/>
+          </a:prstGeom>
+        </p:spPr>
+        <p:style>
+          <a:lnRef idx="1">
+            <a:schemeClr val="dk1"/>
+          </a:lnRef>
+          <a:fillRef idx="2">
+            <a:schemeClr val="dk1"/>
+          </a:fillRef>
+          <a:effectRef idx="1">
+            <a:schemeClr val="dk1"/>
+          </a:effectRef>
+          <a:fontRef idx="minor">
+            <a:schemeClr val="dk1"/>
+          </a:fontRef>
+        </p:style>
+        <p:txBody>
+          <a:bodyPr rtlCol="0" anchor="ctr"/>
+          <a:lstStyle/>
+          <a:p>
+            <a:pPr algn="ctr"/>
+            <a:r>
+              <a:rPr lang="fr-FR" sz="2400" dirty="0" smtClean="0"/>
+              <a:t>Support de communication</a:t>
+            </a:r>
+            <a:endParaRPr lang="fr-FR" sz="2400" dirty="0"/>
+          </a:p>
+        </p:txBody>
+      </p:sp>
+      <p:cxnSp>
+        <p:nvCxnSpPr>
+          <p:cNvPr id="32" name="Connecteur droit avec flèche 31"/>
+          <p:cNvCxnSpPr>
+            <a:stCxn id="12" idx="2"/>
+          </p:cNvCxnSpPr>
+          <p:nvPr/>
+        </p:nvCxnSpPr>
+        <p:spPr>
+          <a:xfrm>
+            <a:off x="2051720" y="4221088"/>
+            <a:ext cx="0" cy="792088"/>
+          </a:xfrm>
+          <a:prstGeom prst="straightConnector1">
+            <a:avLst/>
+          </a:prstGeom>
+          <a:ln>
+            <a:headEnd type="arrow"/>
+            <a:tailEnd type="arrow"/>
+          </a:ln>
+        </p:spPr>
+        <p:style>
+          <a:lnRef idx="3">
+            <a:schemeClr val="dk1"/>
+          </a:lnRef>
+          <a:fillRef idx="0">
+            <a:schemeClr val="dk1"/>
+          </a:fillRef>
+          <a:effectRef idx="2">
+            <a:schemeClr val="dk1"/>
+          </a:effectRef>
+          <a:fontRef idx="minor">
+            <a:schemeClr val="tx1"/>
+          </a:fontRef>
+        </p:style>
+      </p:cxnSp>
+      <p:cxnSp>
+        <p:nvCxnSpPr>
+          <p:cNvPr id="34" name="Connecteur droit avec flèche 33"/>
+          <p:cNvCxnSpPr>
+            <a:stCxn id="13" idx="2"/>
+          </p:cNvCxnSpPr>
+          <p:nvPr/>
+        </p:nvCxnSpPr>
+        <p:spPr>
+          <a:xfrm>
+            <a:off x="6804248" y="4221088"/>
+            <a:ext cx="0" cy="792088"/>
+          </a:xfrm>
+          <a:prstGeom prst="straightConnector1">
+            <a:avLst/>
+          </a:prstGeom>
+          <a:ln>
+            <a:headEnd type="arrow"/>
+            <a:tailEnd type="arrow"/>
+          </a:ln>
+        </p:spPr>
+        <p:style>
+          <a:lnRef idx="3">
+            <a:schemeClr val="dk1"/>
+          </a:lnRef>
+          <a:fillRef idx="0">
+            <a:schemeClr val="dk1"/>
+          </a:fillRef>
+          <a:effectRef idx="2">
+            <a:schemeClr val="dk1"/>
+          </a:effectRef>
+          <a:fontRef idx="minor">
+            <a:schemeClr val="tx1"/>
+          </a:fontRef>
+        </p:style>
+      </p:cxnSp>
+      <p:cxnSp>
+        <p:nvCxnSpPr>
+          <p:cNvPr id="36" name="Connecteur droit avec flèche 35"/>
+          <p:cNvCxnSpPr>
+            <a:stCxn id="4" idx="2"/>
+            <a:endCxn id="12" idx="0"/>
+          </p:cNvCxnSpPr>
+          <p:nvPr/>
+        </p:nvCxnSpPr>
+        <p:spPr>
+          <a:xfrm>
+            <a:off x="2051720" y="2060848"/>
+            <a:ext cx="0" cy="864096"/>
+          </a:xfrm>
+          <a:prstGeom prst="straightConnector1">
+            <a:avLst/>
+          </a:prstGeom>
+          <a:ln>
+            <a:headEnd type="arrow"/>
+            <a:tailEnd type="arrow"/>
+          </a:ln>
+        </p:spPr>
+        <p:style>
+          <a:lnRef idx="3">
+            <a:schemeClr val="dk1"/>
+          </a:lnRef>
+          <a:fillRef idx="0">
+            <a:schemeClr val="dk1"/>
+          </a:fillRef>
+          <a:effectRef idx="2">
+            <a:schemeClr val="dk1"/>
+          </a:effectRef>
+          <a:fontRef idx="minor">
+            <a:schemeClr val="tx1"/>
+          </a:fontRef>
+        </p:style>
+      </p:cxnSp>
+      <p:cxnSp>
+        <p:nvCxnSpPr>
+          <p:cNvPr id="38" name="Connecteur droit avec flèche 37"/>
+          <p:cNvCxnSpPr>
+            <a:stCxn id="3" idx="2"/>
+            <a:endCxn id="13" idx="0"/>
+          </p:cNvCxnSpPr>
+          <p:nvPr/>
+        </p:nvCxnSpPr>
+        <p:spPr>
+          <a:xfrm>
+            <a:off x="6804248" y="2060848"/>
+            <a:ext cx="0" cy="864096"/>
+          </a:xfrm>
+          <a:prstGeom prst="straightConnector1">
+            <a:avLst/>
+          </a:prstGeom>
+          <a:ln>
+            <a:headEnd type="arrow"/>
+            <a:tailEnd type="arrow"/>
+          </a:ln>
+        </p:spPr>
+        <p:style>
+          <a:lnRef idx="3">
+            <a:schemeClr val="dk1"/>
+          </a:lnRef>
+          <a:fillRef idx="0">
+            <a:schemeClr val="dk1"/>
+          </a:fillRef>
+          <a:effectRef idx="2">
+            <a:schemeClr val="dk1"/>
+          </a:effectRef>
+          <a:fontRef idx="minor">
+            <a:schemeClr val="tx1"/>
+          </a:fontRef>
+        </p:style>
+      </p:cxnSp>
+    </p:spTree>
+    <p:extLst>
+      <p:ext uri="{BB962C8B-B14F-4D97-AF65-F5344CB8AC3E}">
+        <p14:creationId xmlns:p14="http://schemas.microsoft.com/office/powerpoint/2010/main" val="3377806463"/>
+      </p:ext>
+    </p:extLst>
+  </p:cSld>
+  <p:clrMapOvr>
+    <a:masterClrMapping/>
+  </p:clrMapOvr>
+  <p:timing>
+    <p:tnLst>
+      <p:par>
+        <p:cTn id="1" dur="indefinite" restart="never" nodeType="tmRoot"/>
+      </p:par>
+    </p:tnLst>
+  </p:timing>
+</p:sld>
+</file>
+
 <file path=ppt/theme/theme1.xml><?xml version="1.0" encoding="utf-8"?>
 <a:theme xmlns:a="http://schemas.openxmlformats.org/drawingml/2006/main" name="Thème Office">
   <a:themeElements>

</xml_diff>

<commit_message>
[ENSG ASI 2014] Adding images and schemas
</commit_message>
<xml_diff>
--- a/cours/ensg-asi-2014/src/img_gen.pptx
+++ b/cours/ensg-asi-2014/src/img_gen.pptx
@@ -8,6 +8,7 @@
     <p:sldId id="256" r:id="rId2"/>
     <p:sldId id="257" r:id="rId3"/>
     <p:sldId id="258" r:id="rId4"/>
+    <p:sldId id="259" r:id="rId5"/>
   </p:sldIdLst>
   <p:sldSz cx="9144000" cy="6858000" type="screen4x3"/>
   <p:notesSz cx="6858000" cy="9144000"/>
@@ -290,7 +291,7 @@
           <a:p>
             <a:fld id="{B511EEBD-DB93-4DB6-9ADA-68547254FD74}" type="datetimeFigureOut">
               <a:rPr lang="fr-FR" smtClean="0"/>
-              <a:t>18/10/2014</a:t>
+              <a:t>19/10/2014</a:t>
             </a:fld>
             <a:endParaRPr lang="fr-FR"/>
           </a:p>
@@ -460,7 +461,7 @@
           <a:p>
             <a:fld id="{B511EEBD-DB93-4DB6-9ADA-68547254FD74}" type="datetimeFigureOut">
               <a:rPr lang="fr-FR" smtClean="0"/>
-              <a:t>18/10/2014</a:t>
+              <a:t>19/10/2014</a:t>
             </a:fld>
             <a:endParaRPr lang="fr-FR"/>
           </a:p>
@@ -640,7 +641,7 @@
           <a:p>
             <a:fld id="{B511EEBD-DB93-4DB6-9ADA-68547254FD74}" type="datetimeFigureOut">
               <a:rPr lang="fr-FR" smtClean="0"/>
-              <a:t>18/10/2014</a:t>
+              <a:t>19/10/2014</a:t>
             </a:fld>
             <a:endParaRPr lang="fr-FR"/>
           </a:p>
@@ -810,7 +811,7 @@
           <a:p>
             <a:fld id="{B511EEBD-DB93-4DB6-9ADA-68547254FD74}" type="datetimeFigureOut">
               <a:rPr lang="fr-FR" smtClean="0"/>
-              <a:t>18/10/2014</a:t>
+              <a:t>19/10/2014</a:t>
             </a:fld>
             <a:endParaRPr lang="fr-FR"/>
           </a:p>
@@ -1056,7 +1057,7 @@
           <a:p>
             <a:fld id="{B511EEBD-DB93-4DB6-9ADA-68547254FD74}" type="datetimeFigureOut">
               <a:rPr lang="fr-FR" smtClean="0"/>
-              <a:t>18/10/2014</a:t>
+              <a:t>19/10/2014</a:t>
             </a:fld>
             <a:endParaRPr lang="fr-FR"/>
           </a:p>
@@ -1344,7 +1345,7 @@
           <a:p>
             <a:fld id="{B511EEBD-DB93-4DB6-9ADA-68547254FD74}" type="datetimeFigureOut">
               <a:rPr lang="fr-FR" smtClean="0"/>
-              <a:t>18/10/2014</a:t>
+              <a:t>19/10/2014</a:t>
             </a:fld>
             <a:endParaRPr lang="fr-FR"/>
           </a:p>
@@ -1766,7 +1767,7 @@
           <a:p>
             <a:fld id="{B511EEBD-DB93-4DB6-9ADA-68547254FD74}" type="datetimeFigureOut">
               <a:rPr lang="fr-FR" smtClean="0"/>
-              <a:t>18/10/2014</a:t>
+              <a:t>19/10/2014</a:t>
             </a:fld>
             <a:endParaRPr lang="fr-FR"/>
           </a:p>
@@ -1884,7 +1885,7 @@
           <a:p>
             <a:fld id="{B511EEBD-DB93-4DB6-9ADA-68547254FD74}" type="datetimeFigureOut">
               <a:rPr lang="fr-FR" smtClean="0"/>
-              <a:t>18/10/2014</a:t>
+              <a:t>19/10/2014</a:t>
             </a:fld>
             <a:endParaRPr lang="fr-FR"/>
           </a:p>
@@ -1979,7 +1980,7 @@
           <a:p>
             <a:fld id="{B511EEBD-DB93-4DB6-9ADA-68547254FD74}" type="datetimeFigureOut">
               <a:rPr lang="fr-FR" smtClean="0"/>
-              <a:t>18/10/2014</a:t>
+              <a:t>19/10/2014</a:t>
             </a:fld>
             <a:endParaRPr lang="fr-FR"/>
           </a:p>
@@ -2256,7 +2257,7 @@
           <a:p>
             <a:fld id="{B511EEBD-DB93-4DB6-9ADA-68547254FD74}" type="datetimeFigureOut">
               <a:rPr lang="fr-FR" smtClean="0"/>
-              <a:t>18/10/2014</a:t>
+              <a:t>19/10/2014</a:t>
             </a:fld>
             <a:endParaRPr lang="fr-FR"/>
           </a:p>
@@ -2509,7 +2510,7 @@
           <a:p>
             <a:fld id="{B511EEBD-DB93-4DB6-9ADA-68547254FD74}" type="datetimeFigureOut">
               <a:rPr lang="fr-FR" smtClean="0"/>
-              <a:t>18/10/2014</a:t>
+              <a:t>19/10/2014</a:t>
             </a:fld>
             <a:endParaRPr lang="fr-FR"/>
           </a:p>
@@ -2722,7 +2723,7 @@
           <a:p>
             <a:fld id="{B511EEBD-DB93-4DB6-9ADA-68547254FD74}" type="datetimeFigureOut">
               <a:rPr lang="fr-FR" smtClean="0"/>
-              <a:t>18/10/2014</a:t>
+              <a:t>19/10/2014</a:t>
             </a:fld>
             <a:endParaRPr lang="fr-FR"/>
           </a:p>
@@ -3133,7 +3134,7 @@
             <a:pPr algn="ctr"/>
             <a:r>
               <a:rPr lang="fr-FR" sz="4000" dirty="0" smtClean="0"/>
-              <a:t>Client</a:t>
+              <a:t>Tiers</a:t>
             </a:r>
             <a:endParaRPr lang="fr-FR" sz="4000" dirty="0"/>
           </a:p>
@@ -3430,7 +3431,7 @@
         <p:spPr>
           <a:xfrm>
             <a:off x="4427984" y="260648"/>
-            <a:ext cx="3744416" cy="6264696"/>
+            <a:ext cx="3888432" cy="6264696"/>
           </a:xfrm>
           <a:prstGeom prst="rect">
             <a:avLst/>
@@ -3899,10 +3900,1102 @@
           </a:fontRef>
         </p:style>
       </p:cxnSp>
+      <p:cxnSp>
+        <p:nvCxnSpPr>
+          <p:cNvPr id="14" name="Connecteur droit avec flèche 13"/>
+          <p:cNvCxnSpPr/>
+          <p:nvPr/>
+        </p:nvCxnSpPr>
+        <p:spPr>
+          <a:xfrm>
+            <a:off x="3275856" y="3573016"/>
+            <a:ext cx="2304256" cy="0"/>
+          </a:xfrm>
+          <a:prstGeom prst="straightConnector1">
+            <a:avLst/>
+          </a:prstGeom>
+          <a:ln>
+            <a:prstDash val="sysDash"/>
+            <a:headEnd type="arrow"/>
+            <a:tailEnd type="arrow"/>
+          </a:ln>
+        </p:spPr>
+        <p:style>
+          <a:lnRef idx="3">
+            <a:schemeClr val="dk1"/>
+          </a:lnRef>
+          <a:fillRef idx="0">
+            <a:schemeClr val="dk1"/>
+          </a:fillRef>
+          <a:effectRef idx="2">
+            <a:schemeClr val="dk1"/>
+          </a:effectRef>
+          <a:fontRef idx="minor">
+            <a:schemeClr val="tx1"/>
+          </a:fontRef>
+        </p:style>
+      </p:cxnSp>
+      <p:sp>
+        <p:nvSpPr>
+          <p:cNvPr id="2" name="ZoneTexte 1"/>
+          <p:cNvSpPr txBox="1"/>
+          <p:nvPr/>
+        </p:nvSpPr>
+        <p:spPr>
+          <a:xfrm>
+            <a:off x="539552" y="260648"/>
+            <a:ext cx="1006558" cy="461665"/>
+          </a:xfrm>
+          <a:prstGeom prst="rect">
+            <a:avLst/>
+          </a:prstGeom>
+          <a:noFill/>
+        </p:spPr>
+        <p:txBody>
+          <a:bodyPr wrap="none" rtlCol="0">
+            <a:spAutoFit/>
+          </a:bodyPr>
+          <a:lstStyle/>
+          <a:p>
+            <a:r>
+              <a:rPr lang="fr-FR" sz="2400" dirty="0" smtClean="0">
+                <a:solidFill>
+                  <a:schemeClr val="accent6"/>
+                </a:solidFill>
+              </a:rPr>
+              <a:t>Tiers 1</a:t>
+            </a:r>
+            <a:endParaRPr lang="fr-FR" sz="2400" dirty="0">
+              <a:solidFill>
+                <a:schemeClr val="accent6"/>
+              </a:solidFill>
+            </a:endParaRPr>
+          </a:p>
+        </p:txBody>
+      </p:sp>
+      <p:sp>
+        <p:nvSpPr>
+          <p:cNvPr id="16" name="ZoneTexte 15"/>
+          <p:cNvSpPr txBox="1"/>
+          <p:nvPr/>
+        </p:nvSpPr>
+        <p:spPr>
+          <a:xfrm>
+            <a:off x="7309858" y="260648"/>
+            <a:ext cx="1006558" cy="461665"/>
+          </a:xfrm>
+          <a:prstGeom prst="rect">
+            <a:avLst/>
+          </a:prstGeom>
+          <a:noFill/>
+        </p:spPr>
+        <p:txBody>
+          <a:bodyPr wrap="none" rtlCol="0">
+            <a:spAutoFit/>
+          </a:bodyPr>
+          <a:lstStyle/>
+          <a:p>
+            <a:r>
+              <a:rPr lang="fr-FR" sz="2400" dirty="0" smtClean="0">
+                <a:solidFill>
+                  <a:schemeClr val="accent6"/>
+                </a:solidFill>
+              </a:rPr>
+              <a:t>Tiers 2</a:t>
+            </a:r>
+            <a:endParaRPr lang="fr-FR" sz="2400" dirty="0">
+              <a:solidFill>
+                <a:schemeClr val="accent6"/>
+              </a:solidFill>
+            </a:endParaRPr>
+          </a:p>
+        </p:txBody>
+      </p:sp>
+      <p:sp>
+        <p:nvSpPr>
+          <p:cNvPr id="5" name="ZoneTexte 4"/>
+          <p:cNvSpPr txBox="1"/>
+          <p:nvPr/>
+        </p:nvSpPr>
+        <p:spPr>
+          <a:xfrm>
+            <a:off x="3493704" y="704890"/>
+            <a:ext cx="1870384" cy="707886"/>
+          </a:xfrm>
+          <a:prstGeom prst="rect">
+            <a:avLst/>
+          </a:prstGeom>
+          <a:noFill/>
+        </p:spPr>
+        <p:txBody>
+          <a:bodyPr wrap="none" rtlCol="0">
+            <a:spAutoFit/>
+          </a:bodyPr>
+          <a:lstStyle/>
+          <a:p>
+            <a:pPr algn="ctr"/>
+            <a:r>
+              <a:rPr lang="fr-FR" sz="2000" b="1" dirty="0" smtClean="0"/>
+              <a:t>Communication</a:t>
+            </a:r>
+          </a:p>
+          <a:p>
+            <a:pPr algn="ctr"/>
+            <a:r>
+              <a:rPr lang="fr-FR" sz="2000" b="1" dirty="0" smtClean="0"/>
+              <a:t>logique</a:t>
+            </a:r>
+            <a:endParaRPr lang="fr-FR" sz="2000" b="1" dirty="0"/>
+          </a:p>
+        </p:txBody>
+      </p:sp>
+      <p:sp>
+        <p:nvSpPr>
+          <p:cNvPr id="18" name="ZoneTexte 17"/>
+          <p:cNvSpPr txBox="1"/>
+          <p:nvPr/>
+        </p:nvSpPr>
+        <p:spPr>
+          <a:xfrm>
+            <a:off x="3493704" y="2721114"/>
+            <a:ext cx="1870384" cy="707886"/>
+          </a:xfrm>
+          <a:prstGeom prst="rect">
+            <a:avLst/>
+          </a:prstGeom>
+          <a:noFill/>
+        </p:spPr>
+        <p:txBody>
+          <a:bodyPr wrap="none" rtlCol="0">
+            <a:spAutoFit/>
+          </a:bodyPr>
+          <a:lstStyle/>
+          <a:p>
+            <a:pPr algn="ctr"/>
+            <a:r>
+              <a:rPr lang="fr-FR" sz="2000" b="1" dirty="0" smtClean="0"/>
+              <a:t>Communication</a:t>
+            </a:r>
+          </a:p>
+          <a:p>
+            <a:pPr algn="ctr"/>
+            <a:r>
+              <a:rPr lang="fr-FR" sz="2000" b="1" dirty="0" smtClean="0"/>
+              <a:t>logique</a:t>
+            </a:r>
+            <a:endParaRPr lang="fr-FR" sz="2000" b="1" dirty="0"/>
+          </a:p>
+        </p:txBody>
+      </p:sp>
     </p:spTree>
     <p:extLst>
       <p:ext uri="{BB962C8B-B14F-4D97-AF65-F5344CB8AC3E}">
         <p14:creationId xmlns:p14="http://schemas.microsoft.com/office/powerpoint/2010/main" val="3377806463"/>
+      </p:ext>
+    </p:extLst>
+  </p:cSld>
+  <p:clrMapOvr>
+    <a:masterClrMapping/>
+  </p:clrMapOvr>
+  <p:timing>
+    <p:tnLst>
+      <p:par>
+        <p:cTn id="1" dur="indefinite" restart="never" nodeType="tmRoot"/>
+      </p:par>
+    </p:tnLst>
+  </p:timing>
+</p:sld>
+</file>
+
+<file path=ppt/slides/slide4.xml><?xml version="1.0" encoding="utf-8"?>
+<p:sld xmlns:a="http://schemas.openxmlformats.org/drawingml/2006/main" xmlns:r="http://schemas.openxmlformats.org/officeDocument/2006/relationships" xmlns:p="http://schemas.openxmlformats.org/presentationml/2006/main">
+  <p:cSld>
+    <p:spTree>
+      <p:nvGrpSpPr>
+        <p:cNvPr id="1" name=""/>
+        <p:cNvGrpSpPr/>
+        <p:nvPr/>
+      </p:nvGrpSpPr>
+      <p:grpSpPr>
+        <a:xfrm>
+          <a:off x="0" y="0"/>
+          <a:ext cx="0" cy="0"/>
+          <a:chOff x="0" y="0"/>
+          <a:chExt cx="0" cy="0"/>
+        </a:xfrm>
+      </p:grpSpPr>
+      <p:grpSp>
+        <p:nvGrpSpPr>
+          <p:cNvPr id="7" name="Groupe 6"/>
+          <p:cNvGrpSpPr/>
+          <p:nvPr/>
+        </p:nvGrpSpPr>
+        <p:grpSpPr>
+          <a:xfrm>
+            <a:off x="946457" y="584684"/>
+            <a:ext cx="2448272" cy="1296144"/>
+            <a:chOff x="827584" y="764704"/>
+            <a:chExt cx="2448272" cy="1296144"/>
+          </a:xfrm>
+        </p:grpSpPr>
+        <p:sp>
+          <p:nvSpPr>
+            <p:cNvPr id="4" name="Rectangle à coins arrondis 3"/>
+            <p:cNvSpPr/>
+            <p:nvPr/>
+          </p:nvSpPr>
+          <p:spPr>
+            <a:xfrm>
+              <a:off x="827584" y="764704"/>
+              <a:ext cx="2448272" cy="1296144"/>
+            </a:xfrm>
+            <a:prstGeom prst="roundRect">
+              <a:avLst/>
+            </a:prstGeom>
+          </p:spPr>
+          <p:style>
+            <a:lnRef idx="1">
+              <a:schemeClr val="dk1"/>
+            </a:lnRef>
+            <a:fillRef idx="2">
+              <a:schemeClr val="dk1"/>
+            </a:fillRef>
+            <a:effectRef idx="1">
+              <a:schemeClr val="dk1"/>
+            </a:effectRef>
+            <a:fontRef idx="minor">
+              <a:schemeClr val="dk1"/>
+            </a:fontRef>
+          </p:style>
+          <p:txBody>
+            <a:bodyPr rtlCol="0" anchor="ctr"/>
+            <a:lstStyle/>
+            <a:p>
+              <a:r>
+                <a:rPr lang="fr-FR" sz="2000" dirty="0" smtClean="0"/>
+                <a:t>Serveur</a:t>
+              </a:r>
+              <a:endParaRPr lang="fr-FR" sz="2000" dirty="0"/>
+            </a:p>
+          </p:txBody>
+        </p:sp>
+        <p:sp>
+          <p:nvSpPr>
+            <p:cNvPr id="6" name="Cylindre 5"/>
+            <p:cNvSpPr/>
+            <p:nvPr/>
+          </p:nvSpPr>
+          <p:spPr>
+            <a:xfrm>
+              <a:off x="2051720" y="944724"/>
+              <a:ext cx="1080120" cy="936104"/>
+            </a:xfrm>
+            <a:prstGeom prst="can">
+              <a:avLst/>
+            </a:prstGeom>
+          </p:spPr>
+          <p:style>
+            <a:lnRef idx="2">
+              <a:schemeClr val="accent6">
+                <a:shade val="50000"/>
+              </a:schemeClr>
+            </a:lnRef>
+            <a:fillRef idx="1">
+              <a:schemeClr val="accent6"/>
+            </a:fillRef>
+            <a:effectRef idx="0">
+              <a:schemeClr val="accent6"/>
+            </a:effectRef>
+            <a:fontRef idx="minor">
+              <a:schemeClr val="lt1"/>
+            </a:fontRef>
+          </p:style>
+          <p:txBody>
+            <a:bodyPr rtlCol="0" anchor="ctr"/>
+            <a:lstStyle/>
+            <a:p>
+              <a:pPr algn="ctr"/>
+              <a:r>
+                <a:rPr lang="fr-FR" dirty="0" smtClean="0"/>
+                <a:t>Donnée</a:t>
+              </a:r>
+              <a:endParaRPr lang="fr-FR" dirty="0"/>
+            </a:p>
+          </p:txBody>
+        </p:sp>
+      </p:grpSp>
+      <p:grpSp>
+        <p:nvGrpSpPr>
+          <p:cNvPr id="20" name="Groupe 19"/>
+          <p:cNvGrpSpPr/>
+          <p:nvPr/>
+        </p:nvGrpSpPr>
+        <p:grpSpPr>
+          <a:xfrm>
+            <a:off x="946457" y="4067797"/>
+            <a:ext cx="2448272" cy="2052228"/>
+            <a:chOff x="845599" y="3681028"/>
+            <a:chExt cx="2448272" cy="2052228"/>
+          </a:xfrm>
+        </p:grpSpPr>
+        <p:sp>
+          <p:nvSpPr>
+            <p:cNvPr id="23" name="Rectangle à coins arrondis 22"/>
+            <p:cNvSpPr/>
+            <p:nvPr/>
+          </p:nvSpPr>
+          <p:spPr>
+            <a:xfrm>
+              <a:off x="845599" y="3681028"/>
+              <a:ext cx="2448272" cy="2052228"/>
+            </a:xfrm>
+            <a:prstGeom prst="roundRect">
+              <a:avLst/>
+            </a:prstGeom>
+          </p:spPr>
+          <p:style>
+            <a:lnRef idx="1">
+              <a:schemeClr val="dk1"/>
+            </a:lnRef>
+            <a:fillRef idx="2">
+              <a:schemeClr val="dk1"/>
+            </a:fillRef>
+            <a:effectRef idx="1">
+              <a:schemeClr val="dk1"/>
+            </a:effectRef>
+            <a:fontRef idx="minor">
+              <a:schemeClr val="dk1"/>
+            </a:fontRef>
+          </p:style>
+          <p:txBody>
+            <a:bodyPr rtlCol="0" anchor="ctr"/>
+            <a:lstStyle/>
+            <a:p>
+              <a:r>
+                <a:rPr lang="fr-FR" sz="2000" dirty="0" smtClean="0"/>
+                <a:t>Client</a:t>
+              </a:r>
+              <a:endParaRPr lang="fr-FR" sz="2000" dirty="0"/>
+            </a:p>
+          </p:txBody>
+        </p:sp>
+        <p:sp>
+          <p:nvSpPr>
+            <p:cNvPr id="8" name="Éclair 7"/>
+            <p:cNvSpPr/>
+            <p:nvPr/>
+          </p:nvSpPr>
+          <p:spPr>
+            <a:xfrm>
+              <a:off x="2051720" y="3934067"/>
+              <a:ext cx="936104" cy="720080"/>
+            </a:xfrm>
+            <a:prstGeom prst="lightningBolt">
+              <a:avLst/>
+            </a:prstGeom>
+          </p:spPr>
+          <p:style>
+            <a:lnRef idx="2">
+              <a:schemeClr val="accent3">
+                <a:shade val="50000"/>
+              </a:schemeClr>
+            </a:lnRef>
+            <a:fillRef idx="1">
+              <a:schemeClr val="accent3"/>
+            </a:fillRef>
+            <a:effectRef idx="0">
+              <a:schemeClr val="accent3"/>
+            </a:effectRef>
+            <a:fontRef idx="minor">
+              <a:schemeClr val="lt1"/>
+            </a:fontRef>
+          </p:style>
+          <p:txBody>
+            <a:bodyPr rtlCol="0" anchor="ctr"/>
+            <a:lstStyle/>
+            <a:p>
+              <a:pPr algn="ctr"/>
+              <a:endParaRPr lang="fr-FR"/>
+            </a:p>
+          </p:txBody>
+        </p:sp>
+        <p:sp>
+          <p:nvSpPr>
+            <p:cNvPr id="9" name="Émoticône 8"/>
+            <p:cNvSpPr/>
+            <p:nvPr/>
+          </p:nvSpPr>
+          <p:spPr>
+            <a:xfrm>
+              <a:off x="2170593" y="5085184"/>
+              <a:ext cx="630057" cy="576064"/>
+            </a:xfrm>
+            <a:prstGeom prst="smileyFace">
+              <a:avLst/>
+            </a:prstGeom>
+          </p:spPr>
+          <p:style>
+            <a:lnRef idx="2">
+              <a:schemeClr val="accent3">
+                <a:shade val="50000"/>
+              </a:schemeClr>
+            </a:lnRef>
+            <a:fillRef idx="1">
+              <a:schemeClr val="accent3"/>
+            </a:fillRef>
+            <a:effectRef idx="0">
+              <a:schemeClr val="accent3"/>
+            </a:effectRef>
+            <a:fontRef idx="minor">
+              <a:schemeClr val="lt1"/>
+            </a:fontRef>
+          </p:style>
+          <p:txBody>
+            <a:bodyPr rtlCol="0" anchor="ctr"/>
+            <a:lstStyle/>
+            <a:p>
+              <a:pPr algn="ctr"/>
+              <a:endParaRPr lang="fr-FR"/>
+            </a:p>
+          </p:txBody>
+        </p:sp>
+        <p:cxnSp>
+          <p:nvCxnSpPr>
+            <p:cNvPr id="11" name="Connecteur droit avec flèche 10"/>
+            <p:cNvCxnSpPr>
+              <a:stCxn id="8" idx="3"/>
+              <a:endCxn id="9" idx="0"/>
+            </p:cNvCxnSpPr>
+            <p:nvPr/>
+          </p:nvCxnSpPr>
+          <p:spPr>
+            <a:xfrm>
+              <a:off x="2485622" y="4431289"/>
+              <a:ext cx="0" cy="653895"/>
+            </a:xfrm>
+            <a:prstGeom prst="straightConnector1">
+              <a:avLst/>
+            </a:prstGeom>
+            <a:ln>
+              <a:headEnd type="arrow"/>
+              <a:tailEnd type="arrow"/>
+            </a:ln>
+          </p:spPr>
+          <p:style>
+            <a:lnRef idx="2">
+              <a:schemeClr val="dk1"/>
+            </a:lnRef>
+            <a:fillRef idx="0">
+              <a:schemeClr val="dk1"/>
+            </a:fillRef>
+            <a:effectRef idx="1">
+              <a:schemeClr val="dk1"/>
+            </a:effectRef>
+            <a:fontRef idx="minor">
+              <a:schemeClr val="tx1"/>
+            </a:fontRef>
+          </p:style>
+        </p:cxnSp>
+      </p:grpSp>
+      <p:sp>
+        <p:nvSpPr>
+          <p:cNvPr id="37" name="Rectangle à coins arrondis 36"/>
+          <p:cNvSpPr/>
+          <p:nvPr/>
+        </p:nvSpPr>
+        <p:spPr>
+          <a:xfrm>
+            <a:off x="262381" y="2600908"/>
+            <a:ext cx="3816424" cy="648072"/>
+          </a:xfrm>
+          <a:prstGeom prst="roundRect">
+            <a:avLst/>
+          </a:prstGeom>
+        </p:spPr>
+        <p:style>
+          <a:lnRef idx="1">
+            <a:schemeClr val="dk1"/>
+          </a:lnRef>
+          <a:fillRef idx="2">
+            <a:schemeClr val="dk1"/>
+          </a:fillRef>
+          <a:effectRef idx="1">
+            <a:schemeClr val="dk1"/>
+          </a:effectRef>
+          <a:fontRef idx="minor">
+            <a:schemeClr val="dk1"/>
+          </a:fontRef>
+        </p:style>
+        <p:txBody>
+          <a:bodyPr rtlCol="0" anchor="ctr"/>
+          <a:lstStyle/>
+          <a:p>
+            <a:pPr algn="ctr"/>
+            <a:r>
+              <a:rPr lang="fr-FR" sz="2400" dirty="0" smtClean="0"/>
+              <a:t>Middleware</a:t>
+            </a:r>
+            <a:endParaRPr lang="fr-FR" sz="2400" dirty="0"/>
+          </a:p>
+        </p:txBody>
+      </p:sp>
+      <p:cxnSp>
+        <p:nvCxnSpPr>
+          <p:cNvPr id="41" name="Connecteur droit avec flèche 40"/>
+          <p:cNvCxnSpPr>
+            <a:stCxn id="4" idx="2"/>
+            <a:endCxn id="37" idx="0"/>
+          </p:cNvCxnSpPr>
+          <p:nvPr/>
+        </p:nvCxnSpPr>
+        <p:spPr>
+          <a:xfrm>
+            <a:off x="2170593" y="1880828"/>
+            <a:ext cx="0" cy="720080"/>
+          </a:xfrm>
+          <a:prstGeom prst="straightConnector1">
+            <a:avLst/>
+          </a:prstGeom>
+          <a:ln>
+            <a:headEnd type="arrow"/>
+            <a:tailEnd type="arrow"/>
+          </a:ln>
+        </p:spPr>
+        <p:style>
+          <a:lnRef idx="3">
+            <a:schemeClr val="dk1"/>
+          </a:lnRef>
+          <a:fillRef idx="0">
+            <a:schemeClr val="dk1"/>
+          </a:fillRef>
+          <a:effectRef idx="2">
+            <a:schemeClr val="dk1"/>
+          </a:effectRef>
+          <a:fontRef idx="minor">
+            <a:schemeClr val="tx1"/>
+          </a:fontRef>
+        </p:style>
+      </p:cxnSp>
+      <p:cxnSp>
+        <p:nvCxnSpPr>
+          <p:cNvPr id="42" name="Connecteur droit avec flèche 41"/>
+          <p:cNvCxnSpPr>
+            <a:stCxn id="37" idx="2"/>
+            <a:endCxn id="23" idx="0"/>
+          </p:cNvCxnSpPr>
+          <p:nvPr/>
+        </p:nvCxnSpPr>
+        <p:spPr>
+          <a:xfrm>
+            <a:off x="2170593" y="3248980"/>
+            <a:ext cx="0" cy="818817"/>
+          </a:xfrm>
+          <a:prstGeom prst="straightConnector1">
+            <a:avLst/>
+          </a:prstGeom>
+          <a:ln>
+            <a:headEnd type="arrow"/>
+            <a:tailEnd type="arrow"/>
+          </a:ln>
+        </p:spPr>
+        <p:style>
+          <a:lnRef idx="3">
+            <a:schemeClr val="dk1"/>
+          </a:lnRef>
+          <a:fillRef idx="0">
+            <a:schemeClr val="dk1"/>
+          </a:fillRef>
+          <a:effectRef idx="2">
+            <a:schemeClr val="dk1"/>
+          </a:effectRef>
+          <a:fontRef idx="minor">
+            <a:schemeClr val="tx1"/>
+          </a:fontRef>
+        </p:style>
+      </p:cxnSp>
+      <p:sp>
+        <p:nvSpPr>
+          <p:cNvPr id="45" name="Rectangle à coins arrondis 44"/>
+          <p:cNvSpPr/>
+          <p:nvPr/>
+        </p:nvSpPr>
+        <p:spPr>
+          <a:xfrm>
+            <a:off x="5688124" y="629962"/>
+            <a:ext cx="2448272" cy="2294981"/>
+          </a:xfrm>
+          <a:prstGeom prst="roundRect">
+            <a:avLst/>
+          </a:prstGeom>
+        </p:spPr>
+        <p:style>
+          <a:lnRef idx="1">
+            <a:schemeClr val="dk1"/>
+          </a:lnRef>
+          <a:fillRef idx="2">
+            <a:schemeClr val="dk1"/>
+          </a:fillRef>
+          <a:effectRef idx="1">
+            <a:schemeClr val="dk1"/>
+          </a:effectRef>
+          <a:fontRef idx="minor">
+            <a:schemeClr val="dk1"/>
+          </a:fontRef>
+        </p:style>
+        <p:txBody>
+          <a:bodyPr rtlCol="0" anchor="ctr"/>
+          <a:lstStyle/>
+          <a:p>
+            <a:r>
+              <a:rPr lang="fr-FR" sz="2000" dirty="0" smtClean="0"/>
+              <a:t>Serveur</a:t>
+            </a:r>
+            <a:endParaRPr lang="fr-FR" sz="2000" dirty="0"/>
+          </a:p>
+        </p:txBody>
+      </p:sp>
+      <p:sp>
+        <p:nvSpPr>
+          <p:cNvPr id="46" name="Cylindre 45"/>
+          <p:cNvSpPr/>
+          <p:nvPr/>
+        </p:nvSpPr>
+        <p:spPr>
+          <a:xfrm>
+            <a:off x="6912260" y="809983"/>
+            <a:ext cx="1080120" cy="936104"/>
+          </a:xfrm>
+          <a:prstGeom prst="can">
+            <a:avLst/>
+          </a:prstGeom>
+        </p:spPr>
+        <p:style>
+          <a:lnRef idx="2">
+            <a:schemeClr val="accent6">
+              <a:shade val="50000"/>
+            </a:schemeClr>
+          </a:lnRef>
+          <a:fillRef idx="1">
+            <a:schemeClr val="accent6"/>
+          </a:fillRef>
+          <a:effectRef idx="0">
+            <a:schemeClr val="accent6"/>
+          </a:effectRef>
+          <a:fontRef idx="minor">
+            <a:schemeClr val="lt1"/>
+          </a:fontRef>
+        </p:style>
+        <p:txBody>
+          <a:bodyPr rtlCol="0" anchor="ctr"/>
+          <a:lstStyle/>
+          <a:p>
+            <a:pPr algn="ctr"/>
+            <a:r>
+              <a:rPr lang="fr-FR" dirty="0" smtClean="0"/>
+              <a:t>Donnée</a:t>
+            </a:r>
+            <a:endParaRPr lang="fr-FR" dirty="0"/>
+          </a:p>
+        </p:txBody>
+      </p:sp>
+      <p:sp>
+        <p:nvSpPr>
+          <p:cNvPr id="48" name="Rectangle à coins arrondis 47"/>
+          <p:cNvSpPr/>
+          <p:nvPr/>
+        </p:nvSpPr>
+        <p:spPr>
+          <a:xfrm>
+            <a:off x="5688124" y="5040916"/>
+            <a:ext cx="2448272" cy="1124388"/>
+          </a:xfrm>
+          <a:prstGeom prst="roundRect">
+            <a:avLst/>
+          </a:prstGeom>
+        </p:spPr>
+        <p:style>
+          <a:lnRef idx="1">
+            <a:schemeClr val="dk1"/>
+          </a:lnRef>
+          <a:fillRef idx="2">
+            <a:schemeClr val="dk1"/>
+          </a:fillRef>
+          <a:effectRef idx="1">
+            <a:schemeClr val="dk1"/>
+          </a:effectRef>
+          <a:fontRef idx="minor">
+            <a:schemeClr val="dk1"/>
+          </a:fontRef>
+        </p:style>
+        <p:txBody>
+          <a:bodyPr rtlCol="0" anchor="ctr"/>
+          <a:lstStyle/>
+          <a:p>
+            <a:r>
+              <a:rPr lang="fr-FR" sz="2000" dirty="0" smtClean="0"/>
+              <a:t>    Client</a:t>
+            </a:r>
+            <a:endParaRPr lang="fr-FR" sz="2000" dirty="0"/>
+          </a:p>
+        </p:txBody>
+      </p:sp>
+      <p:sp>
+        <p:nvSpPr>
+          <p:cNvPr id="49" name="Éclair 48"/>
+          <p:cNvSpPr/>
+          <p:nvPr/>
+        </p:nvSpPr>
+        <p:spPr>
+          <a:xfrm>
+            <a:off x="6884550" y="2078796"/>
+            <a:ext cx="936104" cy="720080"/>
+          </a:xfrm>
+          <a:prstGeom prst="lightningBolt">
+            <a:avLst/>
+          </a:prstGeom>
+        </p:spPr>
+        <p:style>
+          <a:lnRef idx="2">
+            <a:schemeClr val="accent6">
+              <a:shade val="50000"/>
+            </a:schemeClr>
+          </a:lnRef>
+          <a:fillRef idx="1">
+            <a:schemeClr val="accent6"/>
+          </a:fillRef>
+          <a:effectRef idx="0">
+            <a:schemeClr val="accent6"/>
+          </a:effectRef>
+          <a:fontRef idx="minor">
+            <a:schemeClr val="lt1"/>
+          </a:fontRef>
+        </p:style>
+        <p:txBody>
+          <a:bodyPr rtlCol="0" anchor="ctr"/>
+          <a:lstStyle/>
+          <a:p>
+            <a:pPr algn="ctr"/>
+            <a:endParaRPr lang="fr-FR"/>
+          </a:p>
+        </p:txBody>
+      </p:sp>
+      <p:sp>
+        <p:nvSpPr>
+          <p:cNvPr id="50" name="Émoticône 49"/>
+          <p:cNvSpPr/>
+          <p:nvPr/>
+        </p:nvSpPr>
+        <p:spPr>
+          <a:xfrm>
+            <a:off x="7020272" y="5301208"/>
+            <a:ext cx="630057" cy="576064"/>
+          </a:xfrm>
+          <a:prstGeom prst="smileyFace">
+            <a:avLst/>
+          </a:prstGeom>
+        </p:spPr>
+        <p:style>
+          <a:lnRef idx="2">
+            <a:schemeClr val="accent3">
+              <a:shade val="50000"/>
+            </a:schemeClr>
+          </a:lnRef>
+          <a:fillRef idx="1">
+            <a:schemeClr val="accent3"/>
+          </a:fillRef>
+          <a:effectRef idx="0">
+            <a:schemeClr val="accent3"/>
+          </a:effectRef>
+          <a:fontRef idx="minor">
+            <a:schemeClr val="lt1"/>
+          </a:fontRef>
+        </p:style>
+        <p:txBody>
+          <a:bodyPr rtlCol="0" anchor="ctr"/>
+          <a:lstStyle/>
+          <a:p>
+            <a:pPr algn="ctr"/>
+            <a:endParaRPr lang="fr-FR"/>
+          </a:p>
+        </p:txBody>
+      </p:sp>
+      <p:cxnSp>
+        <p:nvCxnSpPr>
+          <p:cNvPr id="51" name="Connecteur droit avec flèche 50"/>
+          <p:cNvCxnSpPr>
+            <a:stCxn id="49" idx="6"/>
+            <a:endCxn id="46" idx="3"/>
+          </p:cNvCxnSpPr>
+          <p:nvPr/>
+        </p:nvCxnSpPr>
+        <p:spPr>
+          <a:xfrm flipV="1">
+            <a:off x="7441879" y="1746087"/>
+            <a:ext cx="10441" cy="535398"/>
+          </a:xfrm>
+          <a:prstGeom prst="straightConnector1">
+            <a:avLst/>
+          </a:prstGeom>
+          <a:ln>
+            <a:headEnd type="arrow"/>
+            <a:tailEnd type="arrow"/>
+          </a:ln>
+        </p:spPr>
+        <p:style>
+          <a:lnRef idx="2">
+            <a:schemeClr val="dk1"/>
+          </a:lnRef>
+          <a:fillRef idx="0">
+            <a:schemeClr val="dk1"/>
+          </a:fillRef>
+          <a:effectRef idx="1">
+            <a:schemeClr val="dk1"/>
+          </a:effectRef>
+          <a:fontRef idx="minor">
+            <a:schemeClr val="tx1"/>
+          </a:fontRef>
+        </p:style>
+      </p:cxnSp>
+      <p:sp>
+        <p:nvSpPr>
+          <p:cNvPr id="52" name="Rectangle à coins arrondis 51"/>
+          <p:cNvSpPr/>
+          <p:nvPr/>
+        </p:nvSpPr>
+        <p:spPr>
+          <a:xfrm>
+            <a:off x="5004048" y="3672764"/>
+            <a:ext cx="3816424" cy="648072"/>
+          </a:xfrm>
+          <a:prstGeom prst="roundRect">
+            <a:avLst/>
+          </a:prstGeom>
+        </p:spPr>
+        <p:style>
+          <a:lnRef idx="1">
+            <a:schemeClr val="dk1"/>
+          </a:lnRef>
+          <a:fillRef idx="2">
+            <a:schemeClr val="dk1"/>
+          </a:fillRef>
+          <a:effectRef idx="1">
+            <a:schemeClr val="dk1"/>
+          </a:effectRef>
+          <a:fontRef idx="minor">
+            <a:schemeClr val="dk1"/>
+          </a:fontRef>
+        </p:style>
+        <p:txBody>
+          <a:bodyPr rtlCol="0" anchor="ctr"/>
+          <a:lstStyle/>
+          <a:p>
+            <a:pPr algn="ctr"/>
+            <a:r>
+              <a:rPr lang="fr-FR" sz="2400" dirty="0" smtClean="0"/>
+              <a:t>Middleware</a:t>
+            </a:r>
+            <a:endParaRPr lang="fr-FR" sz="2400" dirty="0"/>
+          </a:p>
+        </p:txBody>
+      </p:sp>
+      <p:cxnSp>
+        <p:nvCxnSpPr>
+          <p:cNvPr id="53" name="Connecteur droit avec flèche 52"/>
+          <p:cNvCxnSpPr>
+            <a:stCxn id="45" idx="2"/>
+            <a:endCxn id="52" idx="0"/>
+          </p:cNvCxnSpPr>
+          <p:nvPr/>
+        </p:nvCxnSpPr>
+        <p:spPr>
+          <a:xfrm>
+            <a:off x="6912260" y="2924943"/>
+            <a:ext cx="0" cy="747821"/>
+          </a:xfrm>
+          <a:prstGeom prst="straightConnector1">
+            <a:avLst/>
+          </a:prstGeom>
+          <a:ln>
+            <a:headEnd type="arrow"/>
+            <a:tailEnd type="arrow"/>
+          </a:ln>
+        </p:spPr>
+        <p:style>
+          <a:lnRef idx="3">
+            <a:schemeClr val="dk1"/>
+          </a:lnRef>
+          <a:fillRef idx="0">
+            <a:schemeClr val="dk1"/>
+          </a:fillRef>
+          <a:effectRef idx="2">
+            <a:schemeClr val="dk1"/>
+          </a:effectRef>
+          <a:fontRef idx="minor">
+            <a:schemeClr val="tx1"/>
+          </a:fontRef>
+        </p:style>
+      </p:cxnSp>
+      <p:cxnSp>
+        <p:nvCxnSpPr>
+          <p:cNvPr id="54" name="Connecteur droit avec flèche 53"/>
+          <p:cNvCxnSpPr>
+            <a:stCxn id="52" idx="2"/>
+            <a:endCxn id="48" idx="0"/>
+          </p:cNvCxnSpPr>
+          <p:nvPr/>
+        </p:nvCxnSpPr>
+        <p:spPr>
+          <a:xfrm>
+            <a:off x="6912260" y="4320836"/>
+            <a:ext cx="0" cy="720080"/>
+          </a:xfrm>
+          <a:prstGeom prst="straightConnector1">
+            <a:avLst/>
+          </a:prstGeom>
+          <a:ln>
+            <a:headEnd type="arrow"/>
+            <a:tailEnd type="arrow"/>
+          </a:ln>
+        </p:spPr>
+        <p:style>
+          <a:lnRef idx="3">
+            <a:schemeClr val="dk1"/>
+          </a:lnRef>
+          <a:fillRef idx="0">
+            <a:schemeClr val="dk1"/>
+          </a:fillRef>
+          <a:effectRef idx="2">
+            <a:schemeClr val="dk1"/>
+          </a:effectRef>
+          <a:fontRef idx="minor">
+            <a:schemeClr val="tx1"/>
+          </a:fontRef>
+        </p:style>
+      </p:cxnSp>
+      <p:sp>
+        <p:nvSpPr>
+          <p:cNvPr id="66" name="ZoneTexte 65"/>
+          <p:cNvSpPr txBox="1"/>
+          <p:nvPr/>
+        </p:nvSpPr>
+        <p:spPr>
+          <a:xfrm>
+            <a:off x="1043608" y="4499828"/>
+            <a:ext cx="1230401" cy="369332"/>
+          </a:xfrm>
+          <a:prstGeom prst="rect">
+            <a:avLst/>
+          </a:prstGeom>
+          <a:noFill/>
+        </p:spPr>
+        <p:txBody>
+          <a:bodyPr wrap="none" rtlCol="0">
+            <a:spAutoFit/>
+          </a:bodyPr>
+          <a:lstStyle/>
+          <a:p>
+            <a:r>
+              <a:rPr lang="fr-FR" b="1" dirty="0" smtClean="0"/>
+              <a:t>Traitement</a:t>
+            </a:r>
+            <a:endParaRPr lang="fr-FR" b="1" dirty="0"/>
+          </a:p>
+        </p:txBody>
+      </p:sp>
+      <p:sp>
+        <p:nvSpPr>
+          <p:cNvPr id="67" name="ZoneTexte 66"/>
+          <p:cNvSpPr txBox="1"/>
+          <p:nvPr/>
+        </p:nvSpPr>
+        <p:spPr>
+          <a:xfrm>
+            <a:off x="5940152" y="2451508"/>
+            <a:ext cx="1230401" cy="369332"/>
+          </a:xfrm>
+          <a:prstGeom prst="rect">
+            <a:avLst/>
+          </a:prstGeom>
+          <a:noFill/>
+        </p:spPr>
+        <p:txBody>
+          <a:bodyPr wrap="none" rtlCol="0">
+            <a:spAutoFit/>
+          </a:bodyPr>
+          <a:lstStyle/>
+          <a:p>
+            <a:r>
+              <a:rPr lang="fr-FR" b="1" dirty="0" smtClean="0"/>
+              <a:t>Traitement</a:t>
+            </a:r>
+            <a:endParaRPr lang="fr-FR" b="1" dirty="0"/>
+          </a:p>
+        </p:txBody>
+      </p:sp>
+      <p:sp>
+        <p:nvSpPr>
+          <p:cNvPr id="68" name="ZoneTexte 67"/>
+          <p:cNvSpPr txBox="1"/>
+          <p:nvPr/>
+        </p:nvSpPr>
+        <p:spPr>
+          <a:xfrm>
+            <a:off x="1763688" y="6237312"/>
+            <a:ext cx="880369" cy="400110"/>
+          </a:xfrm>
+          <a:prstGeom prst="rect">
+            <a:avLst/>
+          </a:prstGeom>
+          <a:noFill/>
+        </p:spPr>
+        <p:txBody>
+          <a:bodyPr wrap="none" rtlCol="0">
+            <a:spAutoFit/>
+          </a:bodyPr>
+          <a:lstStyle/>
+          <a:p>
+            <a:r>
+              <a:rPr lang="fr-FR" sz="2000" b="1" u="sng" dirty="0" smtClean="0"/>
+              <a:t>Type 1</a:t>
+            </a:r>
+            <a:endParaRPr lang="fr-FR" sz="2000" b="1" u="sng" dirty="0"/>
+          </a:p>
+        </p:txBody>
+      </p:sp>
+      <p:sp>
+        <p:nvSpPr>
+          <p:cNvPr id="69" name="ZoneTexte 68"/>
+          <p:cNvSpPr txBox="1"/>
+          <p:nvPr/>
+        </p:nvSpPr>
+        <p:spPr>
+          <a:xfrm>
+            <a:off x="6368990" y="6237312"/>
+            <a:ext cx="880369" cy="400110"/>
+          </a:xfrm>
+          <a:prstGeom prst="rect">
+            <a:avLst/>
+          </a:prstGeom>
+          <a:noFill/>
+        </p:spPr>
+        <p:txBody>
+          <a:bodyPr wrap="none" rtlCol="0">
+            <a:spAutoFit/>
+          </a:bodyPr>
+          <a:lstStyle/>
+          <a:p>
+            <a:r>
+              <a:rPr lang="fr-FR" sz="2000" b="1" u="sng" dirty="0" smtClean="0"/>
+              <a:t>Type 2</a:t>
+            </a:r>
+            <a:endParaRPr lang="fr-FR" sz="2000" b="1" u="sng" dirty="0"/>
+          </a:p>
+        </p:txBody>
+      </p:sp>
+    </p:spTree>
+    <p:extLst>
+      <p:ext uri="{BB962C8B-B14F-4D97-AF65-F5344CB8AC3E}">
+        <p14:creationId xmlns:p14="http://schemas.microsoft.com/office/powerpoint/2010/main" val="1229862796"/>
       </p:ext>
     </p:extLst>
   </p:cSld>

</xml_diff>